<commit_message>
add code and ppt
</commit_message>
<xml_diff>
--- a/ppt/4.2-用magic method定义类的构建.pptx
+++ b/ppt/4.2-用magic method定义类的构建.pptx
@@ -11,9 +11,7 @@
     <p:sldId id="256" r:id="rId3"/>
     <p:sldId id="257" r:id="rId5"/>
     <p:sldId id="258" r:id="rId6"/>
-    <p:sldId id="259" r:id="rId7"/>
-    <p:sldId id="260" r:id="rId8"/>
-    <p:sldId id="261" r:id="rId9"/>
+    <p:sldId id="260" r:id="rId7"/>
   </p:sldIdLst>
   <p:sldSz cx="9144000" cy="5143500"/>
   <p:notesSz cx="6858000" cy="9144000"/>
@@ -44,10 +42,10 @@
         <a:solidFill>
           <a:srgbClr val="000000"/>
         </a:solidFill>
-        <a:latin typeface="Arial" panose="02080604020202020204" charset="0"/>
-        <a:ea typeface="Arial" panose="02080604020202020204" charset="0"/>
-        <a:cs typeface="Arial" panose="02080604020202020204" charset="0"/>
-        <a:sym typeface="Arial" panose="02080604020202020204" charset="0"/>
+        <a:latin typeface="Arial" charset="0"/>
+        <a:ea typeface="Arial" charset="0"/>
+        <a:cs typeface="Arial" charset="0"/>
+        <a:sym typeface="Arial" charset="0"/>
       </a:defRPr>
     </a:lvl1pPr>
     <a:lvl2pPr marR="0" lvl="1" algn="l" rtl="0">
@@ -65,10 +63,10 @@
         <a:solidFill>
           <a:srgbClr val="000000"/>
         </a:solidFill>
-        <a:latin typeface="Arial" panose="02080604020202020204" charset="0"/>
-        <a:ea typeface="Arial" panose="02080604020202020204" charset="0"/>
-        <a:cs typeface="Arial" panose="02080604020202020204" charset="0"/>
-        <a:sym typeface="Arial" panose="02080604020202020204" charset="0"/>
+        <a:latin typeface="Arial" charset="0"/>
+        <a:ea typeface="Arial" charset="0"/>
+        <a:cs typeface="Arial" charset="0"/>
+        <a:sym typeface="Arial" charset="0"/>
       </a:defRPr>
     </a:lvl2pPr>
     <a:lvl3pPr marR="0" lvl="2" algn="l" rtl="0">
@@ -86,10 +84,10 @@
         <a:solidFill>
           <a:srgbClr val="000000"/>
         </a:solidFill>
-        <a:latin typeface="Arial" panose="02080604020202020204" charset="0"/>
-        <a:ea typeface="Arial" panose="02080604020202020204" charset="0"/>
-        <a:cs typeface="Arial" panose="02080604020202020204" charset="0"/>
-        <a:sym typeface="Arial" panose="02080604020202020204" charset="0"/>
+        <a:latin typeface="Arial" charset="0"/>
+        <a:ea typeface="Arial" charset="0"/>
+        <a:cs typeface="Arial" charset="0"/>
+        <a:sym typeface="Arial" charset="0"/>
       </a:defRPr>
     </a:lvl3pPr>
     <a:lvl4pPr marR="0" lvl="3" algn="l" rtl="0">
@@ -107,10 +105,10 @@
         <a:solidFill>
           <a:srgbClr val="000000"/>
         </a:solidFill>
-        <a:latin typeface="Arial" panose="02080604020202020204" charset="0"/>
-        <a:ea typeface="Arial" panose="02080604020202020204" charset="0"/>
-        <a:cs typeface="Arial" panose="02080604020202020204" charset="0"/>
-        <a:sym typeface="Arial" panose="02080604020202020204" charset="0"/>
+        <a:latin typeface="Arial" charset="0"/>
+        <a:ea typeface="Arial" charset="0"/>
+        <a:cs typeface="Arial" charset="0"/>
+        <a:sym typeface="Arial" charset="0"/>
       </a:defRPr>
     </a:lvl4pPr>
     <a:lvl5pPr marR="0" lvl="4" algn="l" rtl="0">
@@ -128,10 +126,10 @@
         <a:solidFill>
           <a:srgbClr val="000000"/>
         </a:solidFill>
-        <a:latin typeface="Arial" panose="02080604020202020204" charset="0"/>
-        <a:ea typeface="Arial" panose="02080604020202020204" charset="0"/>
-        <a:cs typeface="Arial" panose="02080604020202020204" charset="0"/>
-        <a:sym typeface="Arial" panose="02080604020202020204" charset="0"/>
+        <a:latin typeface="Arial" charset="0"/>
+        <a:ea typeface="Arial" charset="0"/>
+        <a:cs typeface="Arial" charset="0"/>
+        <a:sym typeface="Arial" charset="0"/>
       </a:defRPr>
     </a:lvl5pPr>
     <a:lvl6pPr marR="0" lvl="5" algn="l" rtl="0">
@@ -149,10 +147,10 @@
         <a:solidFill>
           <a:srgbClr val="000000"/>
         </a:solidFill>
-        <a:latin typeface="Arial" panose="02080604020202020204" charset="0"/>
-        <a:ea typeface="Arial" panose="02080604020202020204" charset="0"/>
-        <a:cs typeface="Arial" panose="02080604020202020204" charset="0"/>
-        <a:sym typeface="Arial" panose="02080604020202020204" charset="0"/>
+        <a:latin typeface="Arial" charset="0"/>
+        <a:ea typeface="Arial" charset="0"/>
+        <a:cs typeface="Arial" charset="0"/>
+        <a:sym typeface="Arial" charset="0"/>
       </a:defRPr>
     </a:lvl6pPr>
     <a:lvl7pPr marR="0" lvl="6" algn="l" rtl="0">
@@ -170,10 +168,10 @@
         <a:solidFill>
           <a:srgbClr val="000000"/>
         </a:solidFill>
-        <a:latin typeface="Arial" panose="02080604020202020204" charset="0"/>
-        <a:ea typeface="Arial" panose="02080604020202020204" charset="0"/>
-        <a:cs typeface="Arial" panose="02080604020202020204" charset="0"/>
-        <a:sym typeface="Arial" panose="02080604020202020204" charset="0"/>
+        <a:latin typeface="Arial" charset="0"/>
+        <a:ea typeface="Arial" charset="0"/>
+        <a:cs typeface="Arial" charset="0"/>
+        <a:sym typeface="Arial" charset="0"/>
       </a:defRPr>
     </a:lvl7pPr>
     <a:lvl8pPr marR="0" lvl="7" algn="l" rtl="0">
@@ -191,10 +189,10 @@
         <a:solidFill>
           <a:srgbClr val="000000"/>
         </a:solidFill>
-        <a:latin typeface="Arial" panose="02080604020202020204" charset="0"/>
-        <a:ea typeface="Arial" panose="02080604020202020204" charset="0"/>
-        <a:cs typeface="Arial" panose="02080604020202020204" charset="0"/>
-        <a:sym typeface="Arial" panose="02080604020202020204" charset="0"/>
+        <a:latin typeface="Arial" charset="0"/>
+        <a:ea typeface="Arial" charset="0"/>
+        <a:cs typeface="Arial" charset="0"/>
+        <a:sym typeface="Arial" charset="0"/>
       </a:defRPr>
     </a:lvl8pPr>
     <a:lvl9pPr marR="0" lvl="8" algn="l" rtl="0">
@@ -212,10 +210,10 @@
         <a:solidFill>
           <a:srgbClr val="000000"/>
         </a:solidFill>
-        <a:latin typeface="Arial" panose="02080604020202020204" charset="0"/>
-        <a:ea typeface="Arial" panose="02080604020202020204" charset="0"/>
-        <a:cs typeface="Arial" panose="02080604020202020204" charset="0"/>
-        <a:sym typeface="Arial" panose="02080604020202020204" charset="0"/>
+        <a:latin typeface="Arial" charset="0"/>
+        <a:ea typeface="Arial" charset="0"/>
+        <a:cs typeface="Arial" charset="0"/>
+        <a:sym typeface="Arial" charset="0"/>
       </a:defRPr>
     </a:lvl9pPr>
   </p:defaultTextStyle>
@@ -227,6 +225,7 @@
   <p:cSld>
     <p:bg>
       <p:bgPr>
+        <a:noFill/>
         <a:effectLst/>
       </p:bgPr>
     </p:bg>
@@ -564,6 +563,7 @@
               <a:rPr lang="en-GB"/>
               <a:t>首先来谈谈平时定义类的时候。我们一般都会在类里面定义一个 __init__ 这个函数作为类的构造函数。这也是定义类的时候最常用的模式。我们在__init__这个函数里对对象的属性进行了设置，但实际上在一个对象实例化的过程中，在这里其实没有把全部的流程展现出来。</a:t>
             </a:r>
+            <a:endParaRPr lang="en-GB"/>
           </a:p>
         </p:txBody>
       </p:sp>
@@ -663,6 +663,7 @@
               <a:rPr lang="en-GB"/>
               <a:t>下面，我们来说下实例化对象的完整流程。我们在进行类的实例化的时候实际上是有两步，首先是创建一个类的对象，然后再对这个初始的对象进行属性设置。但是实际上我们在定义类的时候并不需要处理新建类的功能，创建初始对象的工作是直接调用父类里的方法完成了。</a:t>
             </a:r>
+            <a:endParaRPr lang="en-GB"/>
           </a:p>
         </p:txBody>
       </p:sp>
@@ -675,105 +676,6 @@
 </file>
 
 <file path=ppt/notesSlides/notesSlide4.xml><?xml version="1.0" encoding="utf-8"?>
-<p:notes xmlns:a="http://schemas.openxmlformats.org/drawingml/2006/main" xmlns:r="http://schemas.openxmlformats.org/officeDocument/2006/relationships" xmlns:p="http://schemas.openxmlformats.org/presentationml/2006/main" showMasterPhAnim="0" showMasterSp="0">
-  <p:cSld>
-    <p:spTree>
-      <p:nvGrpSpPr>
-        <p:cNvPr id="71" name="Shape 71"/>
-        <p:cNvGrpSpPr/>
-        <p:nvPr/>
-      </p:nvGrpSpPr>
-      <p:grpSpPr>
-        <a:xfrm>
-          <a:off x="0" y="0"/>
-          <a:ext cx="0" cy="0"/>
-          <a:chOff x="0" y="0"/>
-          <a:chExt cx="0" cy="0"/>
-        </a:xfrm>
-      </p:grpSpPr>
-      <p:sp>
-        <p:nvSpPr>
-          <p:cNvPr id="72" name="Shape 72"/>
-          <p:cNvSpPr/>
-          <p:nvPr>
-            <p:ph type="sldImg" idx="2"/>
-          </p:nvPr>
-        </p:nvSpPr>
-        <p:spPr>
-          <a:xfrm>
-            <a:off x="381300" y="685800"/>
-            <a:ext cx="6096000" cy="3429000"/>
-          </a:xfrm>
-          <a:custGeom>
-            <a:avLst/>
-            <a:gdLst/>
-            <a:ahLst/>
-            <a:cxnLst/>
-            <a:pathLst>
-              <a:path w="120000" h="120000" extrusionOk="0">
-                <a:moveTo>
-                  <a:pt x="0" y="0"/>
-                </a:moveTo>
-                <a:lnTo>
-                  <a:pt x="120000" y="0"/>
-                </a:lnTo>
-                <a:lnTo>
-                  <a:pt x="120000" y="120000"/>
-                </a:lnTo>
-                <a:lnTo>
-                  <a:pt x="0" y="120000"/>
-                </a:lnTo>
-                <a:close/>
-              </a:path>
-            </a:pathLst>
-          </a:custGeom>
-        </p:spPr>
-      </p:sp>
-      <p:sp>
-        <p:nvSpPr>
-          <p:cNvPr id="73" name="Shape 73"/>
-          <p:cNvSpPr txBox="1"/>
-          <p:nvPr>
-            <p:ph type="body" idx="1"/>
-          </p:nvPr>
-        </p:nvSpPr>
-        <p:spPr>
-          <a:xfrm>
-            <a:off x="685800" y="4343400"/>
-            <a:ext cx="5486400" cy="4114800"/>
-          </a:xfrm>
-          <a:prstGeom prst="rect">
-            <a:avLst/>
-          </a:prstGeom>
-        </p:spPr>
-        <p:txBody>
-          <a:bodyPr lIns="91425" tIns="91425" rIns="91425" bIns="91425" anchor="t" anchorCtr="0">
-            <a:noAutofit/>
-          </a:bodyPr>
-          <a:lstStyle/>
-          <a:p>
-            <a:pPr lvl="0" rtl="0">
-              <a:spcBef>
-                <a:spcPts val="0"/>
-              </a:spcBef>
-              <a:buNone/>
-            </a:pPr>
-            <a:r>
-              <a:rPr lang="en-GB"/>
-              <a:t>那么__new__是在__init__之前调用，它需要返回一个类的初始对象。如果你需要重写__new__这个方法，需要注意这一点，重写的时候，这个方法里面可以加入你自己的逻辑，但是最后一定要返回一个对象。</a:t>
-            </a:r>
-          </a:p>
-        </p:txBody>
-      </p:sp>
-    </p:spTree>
-  </p:cSld>
-  <p:clrMapOvr>
-    <a:masterClrMapping/>
-  </p:clrMapOvr>
-</p:notes>
-</file>
-
-<file path=ppt/notesSlides/notesSlide5.xml><?xml version="1.0" encoding="utf-8"?>
 <p:notes xmlns:a="http://schemas.openxmlformats.org/drawingml/2006/main" xmlns:r="http://schemas.openxmlformats.org/officeDocument/2006/relationships" xmlns:p="http://schemas.openxmlformats.org/presentationml/2006/main" showMasterPhAnim="0" showMasterSp="0">
   <p:cSld>
     <p:spTree>
@@ -861,105 +763,7 @@
               <a:rPr lang="en-GB"/>
               <a:t>然后再来说说在销毁对象时会调用的魔术方法。众所周知，Python有垃圾回收机制，程序猿不需要我们手动的回收内存。那么在一个对象被Python的垃圾回收机制回收的时候，就会调用__del__这个方法。这个方法其实在实际中也很少会使用，一般来说，语言本身的垃圾回收机制并不需要我们去修改。</a:t>
             </a:r>
-          </a:p>
-        </p:txBody>
-      </p:sp>
-    </p:spTree>
-  </p:cSld>
-  <p:clrMapOvr>
-    <a:masterClrMapping/>
-  </p:clrMapOvr>
-</p:notes>
-</file>
-
-<file path=ppt/notesSlides/notesSlide6.xml><?xml version="1.0" encoding="utf-8"?>
-<p:notes xmlns:a="http://schemas.openxmlformats.org/drawingml/2006/main" xmlns:r="http://schemas.openxmlformats.org/officeDocument/2006/relationships" xmlns:p="http://schemas.openxmlformats.org/presentationml/2006/main" showMasterPhAnim="0" showMasterSp="0">
-  <p:cSld>
-    <p:spTree>
-      <p:nvGrpSpPr>
-        <p:cNvPr id="82" name="Shape 82"/>
-        <p:cNvGrpSpPr/>
-        <p:nvPr/>
-      </p:nvGrpSpPr>
-      <p:grpSpPr>
-        <a:xfrm>
-          <a:off x="0" y="0"/>
-          <a:ext cx="0" cy="0"/>
-          <a:chOff x="0" y="0"/>
-          <a:chExt cx="0" cy="0"/>
-        </a:xfrm>
-      </p:grpSpPr>
-      <p:sp>
-        <p:nvSpPr>
-          <p:cNvPr id="83" name="Shape 83"/>
-          <p:cNvSpPr/>
-          <p:nvPr>
-            <p:ph type="sldImg" idx="2"/>
-          </p:nvPr>
-        </p:nvSpPr>
-        <p:spPr>
-          <a:xfrm>
-            <a:off x="381300" y="685800"/>
-            <a:ext cx="6096000" cy="3429000"/>
-          </a:xfrm>
-          <a:custGeom>
-            <a:avLst/>
-            <a:gdLst/>
-            <a:ahLst/>
-            <a:cxnLst/>
-            <a:pathLst>
-              <a:path w="120000" h="120000" extrusionOk="0">
-                <a:moveTo>
-                  <a:pt x="0" y="0"/>
-                </a:moveTo>
-                <a:lnTo>
-                  <a:pt x="120000" y="0"/>
-                </a:lnTo>
-                <a:lnTo>
-                  <a:pt x="120000" y="120000"/>
-                </a:lnTo>
-                <a:lnTo>
-                  <a:pt x="0" y="120000"/>
-                </a:lnTo>
-                <a:close/>
-              </a:path>
-            </a:pathLst>
-          </a:custGeom>
-        </p:spPr>
-      </p:sp>
-      <p:sp>
-        <p:nvSpPr>
-          <p:cNvPr id="84" name="Shape 84"/>
-          <p:cNvSpPr txBox="1"/>
-          <p:nvPr>
-            <p:ph type="body" idx="1"/>
-          </p:nvPr>
-        </p:nvSpPr>
-        <p:spPr>
-          <a:xfrm>
-            <a:off x="685800" y="4343400"/>
-            <a:ext cx="5486400" cy="4114800"/>
-          </a:xfrm>
-          <a:prstGeom prst="rect">
-            <a:avLst/>
-          </a:prstGeom>
-        </p:spPr>
-        <p:txBody>
-          <a:bodyPr lIns="91425" tIns="91425" rIns="91425" bIns="91425" anchor="t" anchorCtr="0">
-            <a:noAutofit/>
-          </a:bodyPr>
-          <a:lstStyle/>
-          <a:p>
-            <a:pPr lvl="0" rtl="0">
-              <a:spcBef>
-                <a:spcPts val="0"/>
-              </a:spcBef>
-              <a:buNone/>
-            </a:pPr>
-            <a:r>
-              <a:rPr lang="en-GB"/>
-              <a:t>最后我们来回顾下跟对象创建，回收有关的这三个magic method。在接下来我会用一个例子来说明对象构造的过程，在里面会用到__new__ 和 __init__ 方法。在这里我们暂时无法演示 __del__ 这个方法，因为垃圾回收的时机我们在程序里并不可控...</a:t>
-            </a:r>
+            <a:endParaRPr lang="en-GB"/>
           </a:p>
         </p:txBody>
       </p:sp>
@@ -1257,6 +1061,7 @@
             <a:fld id="{00000000-1234-1234-1234-123412341234}" type="slidenum">
               <a:rPr lang="en-GB"/>
             </a:fld>
+            <a:endParaRPr lang="en-GB"/>
           </a:p>
         </p:txBody>
       </p:sp>
@@ -1482,6 +1287,7 @@
             <a:fld id="{00000000-1234-1234-1234-123412341234}" type="slidenum">
               <a:rPr lang="en-GB"/>
             </a:fld>
+            <a:endParaRPr lang="en-GB"/>
           </a:p>
         </p:txBody>
       </p:sp>
@@ -1542,6 +1348,7 @@
             <a:fld id="{00000000-1234-1234-1234-123412341234}" type="slidenum">
               <a:rPr lang="en-GB"/>
             </a:fld>
+            <a:endParaRPr lang="en-GB"/>
           </a:p>
         </p:txBody>
       </p:sp>
@@ -1689,6 +1496,7 @@
             <a:fld id="{00000000-1234-1234-1234-123412341234}" type="slidenum">
               <a:rPr lang="en-GB"/>
             </a:fld>
+            <a:endParaRPr lang="en-GB"/>
           </a:p>
         </p:txBody>
       </p:sp>
@@ -1905,6 +1713,7 @@
             <a:fld id="{00000000-1234-1234-1234-123412341234}" type="slidenum">
               <a:rPr lang="en-GB"/>
             </a:fld>
+            <a:endParaRPr lang="en-GB"/>
           </a:p>
         </p:txBody>
       </p:sp>
@@ -2217,6 +2026,7 @@
             <a:fld id="{00000000-1234-1234-1234-123412341234}" type="slidenum">
               <a:rPr lang="en-GB"/>
             </a:fld>
+            <a:endParaRPr lang="en-GB"/>
           </a:p>
         </p:txBody>
       </p:sp>
@@ -2355,6 +2165,7 @@
             <a:fld id="{00000000-1234-1234-1234-123412341234}" type="slidenum">
               <a:rPr lang="en-GB"/>
             </a:fld>
+            <a:endParaRPr lang="en-GB"/>
           </a:p>
         </p:txBody>
       </p:sp>
@@ -2589,6 +2400,7 @@
             <a:fld id="{00000000-1234-1234-1234-123412341234}" type="slidenum">
               <a:rPr lang="en-GB"/>
             </a:fld>
+            <a:endParaRPr lang="en-GB"/>
           </a:p>
         </p:txBody>
       </p:sp>
@@ -2736,6 +2548,7 @@
             <a:fld id="{00000000-1234-1234-1234-123412341234}" type="slidenum">
               <a:rPr lang="en-GB"/>
             </a:fld>
+            <a:endParaRPr lang="en-GB"/>
           </a:p>
         </p:txBody>
       </p:sp>
@@ -3147,6 +2960,7 @@
             <a:fld id="{00000000-1234-1234-1234-123412341234}" type="slidenum">
               <a:rPr lang="en-GB"/>
             </a:fld>
+            <a:endParaRPr lang="en-GB"/>
           </a:p>
         </p:txBody>
       </p:sp>
@@ -3244,6 +3058,7 @@
             <a:fld id="{00000000-1234-1234-1234-123412341234}" type="slidenum">
               <a:rPr lang="en-GB"/>
             </a:fld>
+            <a:endParaRPr lang="en-GB"/>
           </a:p>
         </p:txBody>
       </p:sp>
@@ -3683,6 +3498,11 @@
                 </a:solidFill>
               </a:rPr>
             </a:fld>
+            <a:endParaRPr lang="en-GB" sz="1000">
+              <a:solidFill>
+                <a:schemeClr val="dk2"/>
+              </a:solidFill>
+            </a:endParaRPr>
           </a:p>
         </p:txBody>
       </p:sp>
@@ -3731,10 +3551,10 @@
           <a:solidFill>
             <a:srgbClr val="000000"/>
           </a:solidFill>
-          <a:latin typeface="Arial" panose="02080604020202020204" charset="0"/>
-          <a:ea typeface="Arial" panose="02080604020202020204" charset="0"/>
-          <a:cs typeface="Arial" panose="02080604020202020204" charset="0"/>
-          <a:sym typeface="Arial" panose="02080604020202020204" charset="0"/>
+          <a:latin typeface="Arial" charset="0"/>
+          <a:ea typeface="Arial" charset="0"/>
+          <a:cs typeface="Arial" charset="0"/>
+          <a:sym typeface="Arial" charset="0"/>
         </a:defRPr>
       </a:lvl1pPr>
     </p:titleStyle>
@@ -3765,10 +3585,10 @@
           <a:solidFill>
             <a:srgbClr val="000000"/>
           </a:solidFill>
-          <a:latin typeface="Arial" panose="02080604020202020204" charset="0"/>
-          <a:ea typeface="Arial" panose="02080604020202020204" charset="0"/>
-          <a:cs typeface="Arial" panose="02080604020202020204" charset="0"/>
-          <a:sym typeface="Arial" panose="02080604020202020204" charset="0"/>
+          <a:latin typeface="Arial" charset="0"/>
+          <a:ea typeface="Arial" charset="0"/>
+          <a:cs typeface="Arial" charset="0"/>
+          <a:sym typeface="Arial" charset="0"/>
         </a:defRPr>
       </a:lvl1pPr>
       <a:lvl2pPr marR="0" lvl="1" algn="l" rtl="0">
@@ -3786,10 +3606,10 @@
           <a:solidFill>
             <a:srgbClr val="000000"/>
           </a:solidFill>
-          <a:latin typeface="Arial" panose="02080604020202020204" charset="0"/>
-          <a:ea typeface="Arial" panose="02080604020202020204" charset="0"/>
-          <a:cs typeface="Arial" panose="02080604020202020204" charset="0"/>
-          <a:sym typeface="Arial" panose="02080604020202020204" charset="0"/>
+          <a:latin typeface="Arial" charset="0"/>
+          <a:ea typeface="Arial" charset="0"/>
+          <a:cs typeface="Arial" charset="0"/>
+          <a:sym typeface="Arial" charset="0"/>
         </a:defRPr>
       </a:lvl2pPr>
       <a:lvl3pPr marR="0" lvl="2" algn="l" rtl="0">
@@ -3807,10 +3627,10 @@
           <a:solidFill>
             <a:srgbClr val="000000"/>
           </a:solidFill>
-          <a:latin typeface="Arial" panose="02080604020202020204" charset="0"/>
-          <a:ea typeface="Arial" panose="02080604020202020204" charset="0"/>
-          <a:cs typeface="Arial" panose="02080604020202020204" charset="0"/>
-          <a:sym typeface="Arial" panose="02080604020202020204" charset="0"/>
+          <a:latin typeface="Arial" charset="0"/>
+          <a:ea typeface="Arial" charset="0"/>
+          <a:cs typeface="Arial" charset="0"/>
+          <a:sym typeface="Arial" charset="0"/>
         </a:defRPr>
       </a:lvl3pPr>
       <a:lvl4pPr marR="0" lvl="3" algn="l" rtl="0">
@@ -3828,10 +3648,10 @@
           <a:solidFill>
             <a:srgbClr val="000000"/>
           </a:solidFill>
-          <a:latin typeface="Arial" panose="02080604020202020204" charset="0"/>
-          <a:ea typeface="Arial" panose="02080604020202020204" charset="0"/>
-          <a:cs typeface="Arial" panose="02080604020202020204" charset="0"/>
-          <a:sym typeface="Arial" panose="02080604020202020204" charset="0"/>
+          <a:latin typeface="Arial" charset="0"/>
+          <a:ea typeface="Arial" charset="0"/>
+          <a:cs typeface="Arial" charset="0"/>
+          <a:sym typeface="Arial" charset="0"/>
         </a:defRPr>
       </a:lvl4pPr>
       <a:lvl5pPr marR="0" lvl="4" algn="l" rtl="0">
@@ -3849,10 +3669,10 @@
           <a:solidFill>
             <a:srgbClr val="000000"/>
           </a:solidFill>
-          <a:latin typeface="Arial" panose="02080604020202020204" charset="0"/>
-          <a:ea typeface="Arial" panose="02080604020202020204" charset="0"/>
-          <a:cs typeface="Arial" panose="02080604020202020204" charset="0"/>
-          <a:sym typeface="Arial" panose="02080604020202020204" charset="0"/>
+          <a:latin typeface="Arial" charset="0"/>
+          <a:ea typeface="Arial" charset="0"/>
+          <a:cs typeface="Arial" charset="0"/>
+          <a:sym typeface="Arial" charset="0"/>
         </a:defRPr>
       </a:lvl5pPr>
       <a:lvl6pPr marR="0" lvl="5" algn="l" rtl="0">
@@ -3870,10 +3690,10 @@
           <a:solidFill>
             <a:srgbClr val="000000"/>
           </a:solidFill>
-          <a:latin typeface="Arial" panose="02080604020202020204" charset="0"/>
-          <a:ea typeface="Arial" panose="02080604020202020204" charset="0"/>
-          <a:cs typeface="Arial" panose="02080604020202020204" charset="0"/>
-          <a:sym typeface="Arial" panose="02080604020202020204" charset="0"/>
+          <a:latin typeface="Arial" charset="0"/>
+          <a:ea typeface="Arial" charset="0"/>
+          <a:cs typeface="Arial" charset="0"/>
+          <a:sym typeface="Arial" charset="0"/>
         </a:defRPr>
       </a:lvl6pPr>
       <a:lvl7pPr marR="0" lvl="6" algn="l" rtl="0">
@@ -3891,10 +3711,10 @@
           <a:solidFill>
             <a:srgbClr val="000000"/>
           </a:solidFill>
-          <a:latin typeface="Arial" panose="02080604020202020204" charset="0"/>
-          <a:ea typeface="Arial" panose="02080604020202020204" charset="0"/>
-          <a:cs typeface="Arial" panose="02080604020202020204" charset="0"/>
-          <a:sym typeface="Arial" panose="02080604020202020204" charset="0"/>
+          <a:latin typeface="Arial" charset="0"/>
+          <a:ea typeface="Arial" charset="0"/>
+          <a:cs typeface="Arial" charset="0"/>
+          <a:sym typeface="Arial" charset="0"/>
         </a:defRPr>
       </a:lvl7pPr>
       <a:lvl8pPr marR="0" lvl="7" algn="l" rtl="0">
@@ -3912,10 +3732,10 @@
           <a:solidFill>
             <a:srgbClr val="000000"/>
           </a:solidFill>
-          <a:latin typeface="Arial" panose="02080604020202020204" charset="0"/>
-          <a:ea typeface="Arial" panose="02080604020202020204" charset="0"/>
-          <a:cs typeface="Arial" panose="02080604020202020204" charset="0"/>
-          <a:sym typeface="Arial" panose="02080604020202020204" charset="0"/>
+          <a:latin typeface="Arial" charset="0"/>
+          <a:ea typeface="Arial" charset="0"/>
+          <a:cs typeface="Arial" charset="0"/>
+          <a:sym typeface="Arial" charset="0"/>
         </a:defRPr>
       </a:lvl8pPr>
       <a:lvl9pPr marR="0" lvl="8" algn="l" rtl="0">
@@ -3933,10 +3753,10 @@
           <a:solidFill>
             <a:srgbClr val="000000"/>
           </a:solidFill>
-          <a:latin typeface="Arial" panose="02080604020202020204" charset="0"/>
-          <a:ea typeface="Arial" panose="02080604020202020204" charset="0"/>
-          <a:cs typeface="Arial" panose="02080604020202020204" charset="0"/>
-          <a:sym typeface="Arial" panose="02080604020202020204" charset="0"/>
+          <a:latin typeface="Arial" charset="0"/>
+          <a:ea typeface="Arial" charset="0"/>
+          <a:cs typeface="Arial" charset="0"/>
+          <a:sym typeface="Arial" charset="0"/>
         </a:defRPr>
       </a:lvl9pPr>
     </p:bodyStyle>
@@ -3967,10 +3787,10 @@
           <a:solidFill>
             <a:srgbClr val="000000"/>
           </a:solidFill>
-          <a:latin typeface="Arial" panose="02080604020202020204" charset="0"/>
-          <a:ea typeface="Arial" panose="02080604020202020204" charset="0"/>
-          <a:cs typeface="Arial" panose="02080604020202020204" charset="0"/>
-          <a:sym typeface="Arial" panose="02080604020202020204" charset="0"/>
+          <a:latin typeface="Arial" charset="0"/>
+          <a:ea typeface="Arial" charset="0"/>
+          <a:cs typeface="Arial" charset="0"/>
+          <a:sym typeface="Arial" charset="0"/>
         </a:defRPr>
       </a:lvl1pPr>
       <a:lvl2pPr marR="0" lvl="1" algn="l" rtl="0">
@@ -3988,10 +3808,10 @@
           <a:solidFill>
             <a:srgbClr val="000000"/>
           </a:solidFill>
-          <a:latin typeface="Arial" panose="02080604020202020204" charset="0"/>
-          <a:ea typeface="Arial" panose="02080604020202020204" charset="0"/>
-          <a:cs typeface="Arial" panose="02080604020202020204" charset="0"/>
-          <a:sym typeface="Arial" panose="02080604020202020204" charset="0"/>
+          <a:latin typeface="Arial" charset="0"/>
+          <a:ea typeface="Arial" charset="0"/>
+          <a:cs typeface="Arial" charset="0"/>
+          <a:sym typeface="Arial" charset="0"/>
         </a:defRPr>
       </a:lvl2pPr>
       <a:lvl3pPr marR="0" lvl="2" algn="l" rtl="0">
@@ -4009,10 +3829,10 @@
           <a:solidFill>
             <a:srgbClr val="000000"/>
           </a:solidFill>
-          <a:latin typeface="Arial" panose="02080604020202020204" charset="0"/>
-          <a:ea typeface="Arial" panose="02080604020202020204" charset="0"/>
-          <a:cs typeface="Arial" panose="02080604020202020204" charset="0"/>
-          <a:sym typeface="Arial" panose="02080604020202020204" charset="0"/>
+          <a:latin typeface="Arial" charset="0"/>
+          <a:ea typeface="Arial" charset="0"/>
+          <a:cs typeface="Arial" charset="0"/>
+          <a:sym typeface="Arial" charset="0"/>
         </a:defRPr>
       </a:lvl3pPr>
       <a:lvl4pPr marR="0" lvl="3" algn="l" rtl="0">
@@ -4030,10 +3850,10 @@
           <a:solidFill>
             <a:srgbClr val="000000"/>
           </a:solidFill>
-          <a:latin typeface="Arial" panose="02080604020202020204" charset="0"/>
-          <a:ea typeface="Arial" panose="02080604020202020204" charset="0"/>
-          <a:cs typeface="Arial" panose="02080604020202020204" charset="0"/>
-          <a:sym typeface="Arial" panose="02080604020202020204" charset="0"/>
+          <a:latin typeface="Arial" charset="0"/>
+          <a:ea typeface="Arial" charset="0"/>
+          <a:cs typeface="Arial" charset="0"/>
+          <a:sym typeface="Arial" charset="0"/>
         </a:defRPr>
       </a:lvl4pPr>
       <a:lvl5pPr marR="0" lvl="4" algn="l" rtl="0">
@@ -4051,10 +3871,10 @@
           <a:solidFill>
             <a:srgbClr val="000000"/>
           </a:solidFill>
-          <a:latin typeface="Arial" panose="02080604020202020204" charset="0"/>
-          <a:ea typeface="Arial" panose="02080604020202020204" charset="0"/>
-          <a:cs typeface="Arial" panose="02080604020202020204" charset="0"/>
-          <a:sym typeface="Arial" panose="02080604020202020204" charset="0"/>
+          <a:latin typeface="Arial" charset="0"/>
+          <a:ea typeface="Arial" charset="0"/>
+          <a:cs typeface="Arial" charset="0"/>
+          <a:sym typeface="Arial" charset="0"/>
         </a:defRPr>
       </a:lvl5pPr>
       <a:lvl6pPr marR="0" lvl="5" algn="l" rtl="0">
@@ -4072,10 +3892,10 @@
           <a:solidFill>
             <a:srgbClr val="000000"/>
           </a:solidFill>
-          <a:latin typeface="Arial" panose="02080604020202020204" charset="0"/>
-          <a:ea typeface="Arial" panose="02080604020202020204" charset="0"/>
-          <a:cs typeface="Arial" panose="02080604020202020204" charset="0"/>
-          <a:sym typeface="Arial" panose="02080604020202020204" charset="0"/>
+          <a:latin typeface="Arial" charset="0"/>
+          <a:ea typeface="Arial" charset="0"/>
+          <a:cs typeface="Arial" charset="0"/>
+          <a:sym typeface="Arial" charset="0"/>
         </a:defRPr>
       </a:lvl6pPr>
       <a:lvl7pPr marR="0" lvl="6" algn="l" rtl="0">
@@ -4093,10 +3913,10 @@
           <a:solidFill>
             <a:srgbClr val="000000"/>
           </a:solidFill>
-          <a:latin typeface="Arial" panose="02080604020202020204" charset="0"/>
-          <a:ea typeface="Arial" panose="02080604020202020204" charset="0"/>
-          <a:cs typeface="Arial" panose="02080604020202020204" charset="0"/>
-          <a:sym typeface="Arial" panose="02080604020202020204" charset="0"/>
+          <a:latin typeface="Arial" charset="0"/>
+          <a:ea typeface="Arial" charset="0"/>
+          <a:cs typeface="Arial" charset="0"/>
+          <a:sym typeface="Arial" charset="0"/>
         </a:defRPr>
       </a:lvl7pPr>
       <a:lvl8pPr marR="0" lvl="7" algn="l" rtl="0">
@@ -4114,10 +3934,10 @@
           <a:solidFill>
             <a:srgbClr val="000000"/>
           </a:solidFill>
-          <a:latin typeface="Arial" panose="02080604020202020204" charset="0"/>
-          <a:ea typeface="Arial" panose="02080604020202020204" charset="0"/>
-          <a:cs typeface="Arial" panose="02080604020202020204" charset="0"/>
-          <a:sym typeface="Arial" panose="02080604020202020204" charset="0"/>
+          <a:latin typeface="Arial" charset="0"/>
+          <a:ea typeface="Arial" charset="0"/>
+          <a:cs typeface="Arial" charset="0"/>
+          <a:sym typeface="Arial" charset="0"/>
         </a:defRPr>
       </a:lvl8pPr>
       <a:lvl9pPr marR="0" lvl="8" algn="l" rtl="0">
@@ -4135,10 +3955,10 @@
           <a:solidFill>
             <a:srgbClr val="000000"/>
           </a:solidFill>
-          <a:latin typeface="Arial" panose="02080604020202020204" charset="0"/>
-          <a:ea typeface="Arial" panose="02080604020202020204" charset="0"/>
-          <a:cs typeface="Arial" panose="02080604020202020204" charset="0"/>
-          <a:sym typeface="Arial" panose="02080604020202020204" charset="0"/>
+          <a:latin typeface="Arial" charset="0"/>
+          <a:ea typeface="Arial" charset="0"/>
+          <a:cs typeface="Arial" charset="0"/>
+          <a:sym typeface="Arial" charset="0"/>
         </a:defRPr>
       </a:lvl9pPr>
     </p:otherStyle>
@@ -4202,6 +4022,13 @@
               </a:rPr>
               <a:t>对象的创建和初始化</a:t>
             </a:r>
+            <a:endParaRPr lang="en-GB" sz="3000" b="1" dirty="0" err="1">
+              <a:solidFill>
+                <a:srgbClr val="C9394A"/>
+              </a:solidFill>
+              <a:latin typeface="微软雅黑" charset="0"/>
+              <a:ea typeface="微软雅黑" charset="0"/>
+            </a:endParaRPr>
           </a:p>
         </p:txBody>
       </p:sp>
@@ -4304,6 +4131,13 @@
               </a:rPr>
               <a:t>常用的类定义</a:t>
             </a:r>
+            <a:endParaRPr lang="en-GB" sz="2200" b="1" dirty="0" err="1">
+              <a:solidFill>
+                <a:srgbClr val="C9394A"/>
+              </a:solidFill>
+              <a:latin typeface="微软雅黑" charset="0"/>
+              <a:ea typeface="微软雅黑" charset="0"/>
+            </a:endParaRPr>
           </a:p>
         </p:txBody>
       </p:sp>
@@ -4344,7 +4178,7 @@
                 <a:schemeClr val="dk1"/>
               </a:buClr>
               <a:buSzPct val="73000"/>
-              <a:buFont typeface="Arial" panose="02080604020202020204" charset="0"/>
+              <a:buFont typeface="Arial" charset="0"/>
               <a:buNone/>
             </a:pPr>
             <a:r>
@@ -4920,6 +4754,13 @@
               </a:rPr>
               <a:t>对象实例化的过程</a:t>
             </a:r>
+            <a:endParaRPr lang="en-GB" sz="2200" b="1" dirty="0" err="1">
+              <a:solidFill>
+                <a:srgbClr val="C9394A"/>
+              </a:solidFill>
+              <a:latin typeface="微软雅黑" charset="0"/>
+              <a:ea typeface="微软雅黑" charset="0"/>
+            </a:endParaRPr>
           </a:p>
         </p:txBody>
       </p:sp>
@@ -4958,6 +4799,7 @@
               <a:rPr lang="en-GB"/>
               <a:t>创建类的对象</a:t>
             </a:r>
+            <a:endParaRPr lang="en-GB"/>
           </a:p>
         </p:txBody>
       </p:sp>
@@ -4996,6 +4838,7 @@
               <a:rPr lang="en-GB"/>
               <a:t>初始化对象</a:t>
             </a:r>
+            <a:endParaRPr lang="en-GB"/>
           </a:p>
         </p:txBody>
       </p:sp>
@@ -5032,8 +4875,17 @@
             </a:pPr>
             <a:r>
               <a:rPr lang="en-GB"/>
-              <a:t>def __new__(self )</a:t>
+              <a:t>def __new__(</a:t>
             </a:r>
+            <a:r>
+              <a:rPr lang="en-US" altLang="en-GB"/>
+              <a:t>cls</a:t>
+            </a:r>
+            <a:r>
+              <a:rPr lang="en-GB"/>
+              <a:t> )</a:t>
+            </a:r>
+            <a:endParaRPr lang="en-GB"/>
           </a:p>
         </p:txBody>
       </p:sp>
@@ -5072,9 +4924,45 @@
               <a:rPr lang="en-GB"/>
               <a:t>def __init__(self)</a:t>
             </a:r>
+            <a:endParaRPr lang="en-GB"/>
           </a:p>
         </p:txBody>
       </p:sp>
+      <p:cxnSp>
+        <p:nvCxnSpPr>
+          <p:cNvPr id="6" name="Shape 96"/>
+          <p:cNvCxnSpPr>
+            <a:endCxn id="68" idx="1"/>
+          </p:cNvCxnSpPr>
+          <p:nvPr/>
+        </p:nvCxnSpPr>
+        <p:spPr>
+          <a:xfrm>
+            <a:off x="3373755" y="1709420"/>
+            <a:ext cx="2085340" cy="3175"/>
+          </a:xfrm>
+          <a:prstGeom prst="straightConnector1">
+            <a:avLst/>
+          </a:prstGeom>
+          <a:noFill/>
+          <a:ln w="28575" cap="flat" cmpd="sng">
+            <a:solidFill>
+              <a:srgbClr val="C9394A"/>
+            </a:solidFill>
+            <a:prstDash val="solid"/>
+            <a:round/>
+            <a:headEnd type="none" w="med" len="med"/>
+            <a:tailEnd type="stealth" w="lg" len="lg"/>
+          </a:ln>
+          <a:effectLst>
+            <a:outerShdw blurRad="50799" dist="38100" dir="2700000" algn="tl" rotWithShape="0">
+              <a:srgbClr val="000000">
+                <a:alpha val="40000"/>
+              </a:srgbClr>
+            </a:outerShdw>
+          </a:effectLst>
+        </p:spPr>
+      </p:cxnSp>
     </p:spTree>
   </p:cSld>
   <p:clrMapOvr>
@@ -5083,87 +4971,275 @@
   <p:transition spd="slow">
     <p:fade/>
   </p:transition>
+  <p:timing>
+    <p:tnLst>
+      <p:par>
+        <p:cTn id="1" dur="indefinite" restart="never" nodeType="tmRoot">
+          <p:childTnLst>
+            <p:seq concurrent="1" nextAc="seek">
+              <p:cTn id="2" dur="indefinite" nodeType="mainSeq">
+                <p:childTnLst>
+                  <p:par>
+                    <p:cTn id="3" fill="hold">
+                      <p:stCondLst>
+                        <p:cond delay="indefinite"/>
+                      </p:stCondLst>
+                      <p:childTnLst>
+                        <p:par>
+                          <p:cTn id="4" fill="hold">
+                            <p:stCondLst>
+                              <p:cond delay="0"/>
+                            </p:stCondLst>
+                            <p:childTnLst>
+                              <p:par>
+                                <p:cTn id="5" presetID="10" presetClass="entr" presetSubtype="0" fill="hold" grpId="0" nodeType="clickEffect">
+                                  <p:stCondLst>
+                                    <p:cond delay="0"/>
+                                  </p:stCondLst>
+                                  <p:childTnLst>
+                                    <p:set>
+                                      <p:cBhvr>
+                                        <p:cTn id="6" dur="1" fill="hold">
+                                          <p:stCondLst>
+                                            <p:cond delay="0"/>
+                                          </p:stCondLst>
+                                        </p:cTn>
+                                        <p:tgtEl>
+                                          <p:spTgt spid="67"/>
+                                        </p:tgtEl>
+                                        <p:attrNameLst>
+                                          <p:attrName>style.visibility</p:attrName>
+                                        </p:attrNameLst>
+                                      </p:cBhvr>
+                                      <p:to>
+                                        <p:strVal val="visible"/>
+                                      </p:to>
+                                    </p:set>
+                                    <p:animEffect transition="in" filter="fade">
+                                      <p:cBhvr>
+                                        <p:cTn id="7" dur="500"/>
+                                        <p:tgtEl>
+                                          <p:spTgt spid="67"/>
+                                        </p:tgtEl>
+                                      </p:cBhvr>
+                                    </p:animEffect>
+                                  </p:childTnLst>
+                                </p:cTn>
+                              </p:par>
+                              <p:par>
+                                <p:cTn id="8" presetID="10" presetClass="entr" presetSubtype="0" fill="hold" grpId="0" nodeType="withEffect">
+                                  <p:stCondLst>
+                                    <p:cond delay="0"/>
+                                  </p:stCondLst>
+                                  <p:childTnLst>
+                                    <p:set>
+                                      <p:cBhvr>
+                                        <p:cTn id="9" dur="1" fill="hold">
+                                          <p:stCondLst>
+                                            <p:cond delay="0"/>
+                                          </p:stCondLst>
+                                        </p:cTn>
+                                        <p:tgtEl>
+                                          <p:spTgt spid="69"/>
+                                        </p:tgtEl>
+                                        <p:attrNameLst>
+                                          <p:attrName>style.visibility</p:attrName>
+                                        </p:attrNameLst>
+                                      </p:cBhvr>
+                                      <p:to>
+                                        <p:strVal val="visible"/>
+                                      </p:to>
+                                    </p:set>
+                                    <p:animEffect transition="in" filter="fade">
+                                      <p:cBhvr>
+                                        <p:cTn id="10" dur="500"/>
+                                        <p:tgtEl>
+                                          <p:spTgt spid="69"/>
+                                        </p:tgtEl>
+                                      </p:cBhvr>
+                                    </p:animEffect>
+                                  </p:childTnLst>
+                                </p:cTn>
+                              </p:par>
+                            </p:childTnLst>
+                          </p:cTn>
+                        </p:par>
+                      </p:childTnLst>
+                    </p:cTn>
+                  </p:par>
+                  <p:par>
+                    <p:cTn id="11" fill="hold">
+                      <p:stCondLst>
+                        <p:cond delay="indefinite"/>
+                      </p:stCondLst>
+                      <p:childTnLst>
+                        <p:par>
+                          <p:cTn id="12" fill="hold">
+                            <p:stCondLst>
+                              <p:cond delay="0"/>
+                            </p:stCondLst>
+                            <p:childTnLst>
+                              <p:par>
+                                <p:cTn id="13" presetID="10" presetClass="entr" presetSubtype="0" fill="hold" nodeType="clickEffect">
+                                  <p:stCondLst>
+                                    <p:cond delay="0"/>
+                                  </p:stCondLst>
+                                  <p:childTnLst>
+                                    <p:set>
+                                      <p:cBhvr>
+                                        <p:cTn id="14" dur="1" fill="hold">
+                                          <p:stCondLst>
+                                            <p:cond delay="0"/>
+                                          </p:stCondLst>
+                                        </p:cTn>
+                                        <p:tgtEl>
+                                          <p:spTgt spid="6"/>
+                                        </p:tgtEl>
+                                        <p:attrNameLst>
+                                          <p:attrName>style.visibility</p:attrName>
+                                        </p:attrNameLst>
+                                      </p:cBhvr>
+                                      <p:to>
+                                        <p:strVal val="visible"/>
+                                      </p:to>
+                                    </p:set>
+                                    <p:animEffect transition="in" filter="fade">
+                                      <p:cBhvr>
+                                        <p:cTn id="15" dur="500"/>
+                                        <p:tgtEl>
+                                          <p:spTgt spid="6"/>
+                                        </p:tgtEl>
+                                      </p:cBhvr>
+                                    </p:animEffect>
+                                  </p:childTnLst>
+                                </p:cTn>
+                              </p:par>
+                            </p:childTnLst>
+                          </p:cTn>
+                        </p:par>
+                      </p:childTnLst>
+                    </p:cTn>
+                  </p:par>
+                  <p:par>
+                    <p:cTn id="16" fill="hold">
+                      <p:stCondLst>
+                        <p:cond delay="indefinite"/>
+                      </p:stCondLst>
+                      <p:childTnLst>
+                        <p:par>
+                          <p:cTn id="17" fill="hold">
+                            <p:stCondLst>
+                              <p:cond delay="0"/>
+                            </p:stCondLst>
+                            <p:childTnLst>
+                              <p:par>
+                                <p:cTn id="18" presetID="10" presetClass="entr" presetSubtype="0" fill="hold" grpId="0" nodeType="clickEffect">
+                                  <p:stCondLst>
+                                    <p:cond delay="0"/>
+                                  </p:stCondLst>
+                                  <p:childTnLst>
+                                    <p:set>
+                                      <p:cBhvr>
+                                        <p:cTn id="19" dur="1" fill="hold">
+                                          <p:stCondLst>
+                                            <p:cond delay="0"/>
+                                          </p:stCondLst>
+                                        </p:cTn>
+                                        <p:tgtEl>
+                                          <p:spTgt spid="68"/>
+                                        </p:tgtEl>
+                                        <p:attrNameLst>
+                                          <p:attrName>style.visibility</p:attrName>
+                                        </p:attrNameLst>
+                                      </p:cBhvr>
+                                      <p:to>
+                                        <p:strVal val="visible"/>
+                                      </p:to>
+                                    </p:set>
+                                    <p:animEffect transition="in" filter="fade">
+                                      <p:cBhvr>
+                                        <p:cTn id="20" dur="500"/>
+                                        <p:tgtEl>
+                                          <p:spTgt spid="68"/>
+                                        </p:tgtEl>
+                                      </p:cBhvr>
+                                    </p:animEffect>
+                                  </p:childTnLst>
+                                </p:cTn>
+                              </p:par>
+                              <p:par>
+                                <p:cTn id="21" presetID="10" presetClass="entr" presetSubtype="0" fill="hold" grpId="0" nodeType="withEffect">
+                                  <p:stCondLst>
+                                    <p:cond delay="0"/>
+                                  </p:stCondLst>
+                                  <p:childTnLst>
+                                    <p:set>
+                                      <p:cBhvr>
+                                        <p:cTn id="22" dur="1" fill="hold">
+                                          <p:stCondLst>
+                                            <p:cond delay="0"/>
+                                          </p:stCondLst>
+                                        </p:cTn>
+                                        <p:tgtEl>
+                                          <p:spTgt spid="70"/>
+                                        </p:tgtEl>
+                                        <p:attrNameLst>
+                                          <p:attrName>style.visibility</p:attrName>
+                                        </p:attrNameLst>
+                                      </p:cBhvr>
+                                      <p:to>
+                                        <p:strVal val="visible"/>
+                                      </p:to>
+                                    </p:set>
+                                    <p:animEffect transition="in" filter="fade">
+                                      <p:cBhvr>
+                                        <p:cTn id="23" dur="500"/>
+                                        <p:tgtEl>
+                                          <p:spTgt spid="70"/>
+                                        </p:tgtEl>
+                                      </p:cBhvr>
+                                    </p:animEffect>
+                                  </p:childTnLst>
+                                </p:cTn>
+                              </p:par>
+                            </p:childTnLst>
+                          </p:cTn>
+                        </p:par>
+                      </p:childTnLst>
+                    </p:cTn>
+                  </p:par>
+                </p:childTnLst>
+              </p:cTn>
+              <p:prevCondLst>
+                <p:cond evt="onPrev" delay="0">
+                  <p:tgtEl>
+                    <p:sldTgt/>
+                  </p:tgtEl>
+                </p:cond>
+              </p:prevCondLst>
+              <p:nextCondLst>
+                <p:cond evt="onNext" delay="0">
+                  <p:tgtEl>
+                    <p:sldTgt/>
+                  </p:tgtEl>
+                </p:cond>
+              </p:nextCondLst>
+            </p:seq>
+          </p:childTnLst>
+        </p:cTn>
+      </p:par>
+    </p:tnLst>
+    <p:bldLst>
+      <p:bldP spid="67" grpId="0"/>
+      <p:bldP spid="69" grpId="0"/>
+      <p:bldP spid="68" grpId="0"/>
+      <p:bldP spid="70" grpId="0"/>
+    </p:bldLst>
+  </p:timing>
 </p:sld>
 </file>
 
 <file path=ppt/slides/slide4.xml><?xml version="1.0" encoding="utf-8"?>
-<p:sld xmlns:a="http://schemas.openxmlformats.org/drawingml/2006/main" xmlns:r="http://schemas.openxmlformats.org/officeDocument/2006/relationships" xmlns:p="http://schemas.openxmlformats.org/presentationml/2006/main">
-  <p:cSld>
-    <p:spTree>
-      <p:nvGrpSpPr>
-        <p:cNvPr id="74" name="Shape 74"/>
-        <p:cNvGrpSpPr/>
-        <p:nvPr/>
-      </p:nvGrpSpPr>
-      <p:grpSpPr>
-        <a:xfrm>
-          <a:off x="0" y="0"/>
-          <a:ext cx="0" cy="0"/>
-          <a:chOff x="0" y="0"/>
-          <a:chExt cx="0" cy="0"/>
-        </a:xfrm>
-      </p:grpSpPr>
-      <p:sp>
-        <p:nvSpPr>
-          <p:cNvPr id="75" name="Shape 75"/>
-          <p:cNvSpPr txBox="1"/>
-          <p:nvPr>
-            <p:ph type="title"/>
-          </p:nvPr>
-        </p:nvSpPr>
-        <p:spPr>
-          <a:xfrm>
-            <a:off x="268200" y="2285400"/>
-            <a:ext cx="8520600" cy="572700"/>
-          </a:xfrm>
-          <a:prstGeom prst="rect">
-            <a:avLst/>
-          </a:prstGeom>
-        </p:spPr>
-        <p:txBody>
-          <a:bodyPr lIns="91425" tIns="91425" rIns="91425" bIns="91425" anchor="t" anchorCtr="0">
-            <a:noAutofit/>
-          </a:bodyPr>
-          <a:lstStyle/>
-          <a:p>
-            <a:pPr lvl="0" algn="ctr" rtl="0">
-              <a:spcBef>
-                <a:spcPts val="0"/>
-              </a:spcBef>
-              <a:buNone/>
-            </a:pPr>
-            <a:r>
-              <a:rPr lang="en-GB" sz="3000" b="1" dirty="0" err="1">
-                <a:solidFill>
-                  <a:srgbClr val="C9394A"/>
-                </a:solidFill>
-                <a:latin typeface="微软雅黑" charset="0"/>
-                <a:ea typeface="微软雅黑" charset="0"/>
-              </a:rPr>
-              <a:t>__new__的功能</a:t>
-            </a:r>
-            <a:endParaRPr lang="en-GB" sz="3000" b="1" dirty="0" err="1">
-              <a:solidFill>
-                <a:srgbClr val="C9394A"/>
-              </a:solidFill>
-              <a:latin typeface="微软雅黑" charset="0"/>
-              <a:ea typeface="微软雅黑" charset="0"/>
-            </a:endParaRPr>
-          </a:p>
-        </p:txBody>
-      </p:sp>
-    </p:spTree>
-  </p:cSld>
-  <p:clrMapOvr>
-    <a:masterClrMapping/>
-  </p:clrMapOvr>
-  <p:transition spd="slow">
-    <p:fade/>
-  </p:transition>
-</p:sld>
-</file>
-
-<file path=ppt/slides/slide5.xml><?xml version="1.0" encoding="utf-8"?>
 <p:sld xmlns:a="http://schemas.openxmlformats.org/drawingml/2006/main" xmlns:r="http://schemas.openxmlformats.org/officeDocument/2006/relationships" xmlns:p="http://schemas.openxmlformats.org/presentationml/2006/main">
   <p:cSld>
     <p:spTree>
@@ -5239,7 +5315,7 @@
         </p:nvSpPr>
         <p:spPr>
           <a:xfrm>
-            <a:off x="1302300" y="1152475"/>
+            <a:off x="1795695" y="1276935"/>
             <a:ext cx="6668400" cy="3416400"/>
           </a:xfrm>
           <a:prstGeom prst="rect">
@@ -5261,6 +5337,7 @@
               <a:rPr lang="en-GB"/>
               <a:t>__del__( )</a:t>
             </a:r>
+            <a:endParaRPr lang="en-GB"/>
           </a:p>
         </p:txBody>
       </p:sp>
@@ -5321,225 +5398,6 @@
                                         <p:cTn id="7" dur="1000"/>
                                         <p:tgtEl>
                                           <p:spTgt spid="81"/>
-                                        </p:tgtEl>
-                                      </p:cBhvr>
-                                    </p:animEffect>
-                                  </p:childTnLst>
-                                </p:cTn>
-                              </p:par>
-                            </p:childTnLst>
-                          </p:cTn>
-                        </p:par>
-                      </p:childTnLst>
-                    </p:cTn>
-                  </p:par>
-                </p:childTnLst>
-              </p:cTn>
-              <p:prevCondLst>
-                <p:cond evt="onPrev">
-                  <p:tgtEl>
-                    <p:sldTgt/>
-                  </p:tgtEl>
-                </p:cond>
-              </p:prevCondLst>
-              <p:nextCondLst>
-                <p:cond evt="onNext">
-                  <p:tgtEl>
-                    <p:sldTgt/>
-                  </p:tgtEl>
-                </p:cond>
-              </p:nextCondLst>
-            </p:seq>
-          </p:childTnLst>
-        </p:cTn>
-      </p:par>
-    </p:tnLst>
-  </p:timing>
-</p:sld>
-</file>
-
-<file path=ppt/slides/slide6.xml><?xml version="1.0" encoding="utf-8"?>
-<p:sld xmlns:a="http://schemas.openxmlformats.org/drawingml/2006/main" xmlns:r="http://schemas.openxmlformats.org/officeDocument/2006/relationships" xmlns:p="http://schemas.openxmlformats.org/presentationml/2006/main">
-  <p:cSld>
-    <p:spTree>
-      <p:nvGrpSpPr>
-        <p:cNvPr id="85" name="Shape 85"/>
-        <p:cNvGrpSpPr/>
-        <p:nvPr/>
-      </p:nvGrpSpPr>
-      <p:grpSpPr>
-        <a:xfrm>
-          <a:off x="0" y="0"/>
-          <a:ext cx="0" cy="0"/>
-          <a:chOff x="0" y="0"/>
-          <a:chExt cx="0" cy="0"/>
-        </a:xfrm>
-      </p:grpSpPr>
-      <p:sp>
-        <p:nvSpPr>
-          <p:cNvPr id="86" name="Shape 86"/>
-          <p:cNvSpPr txBox="1"/>
-          <p:nvPr>
-            <p:ph type="title"/>
-          </p:nvPr>
-        </p:nvSpPr>
-        <p:spPr>
-          <a:xfrm>
-            <a:off x="311700" y="445025"/>
-            <a:ext cx="8520600" cy="572700"/>
-          </a:xfrm>
-          <a:prstGeom prst="rect">
-            <a:avLst/>
-          </a:prstGeom>
-        </p:spPr>
-        <p:txBody>
-          <a:bodyPr lIns="91425" tIns="91425" rIns="91425" bIns="91425" anchor="t" anchorCtr="0">
-            <a:noAutofit/>
-          </a:bodyPr>
-          <a:lstStyle/>
-          <a:p>
-            <a:pPr lvl="0" algn="ctr" rtl="0">
-              <a:spcBef>
-                <a:spcPts val="0"/>
-              </a:spcBef>
-              <a:buNone/>
-            </a:pPr>
-            <a:r>
-              <a:rPr lang="en-GB" sz="2200" b="1" dirty="0" err="1">
-                <a:solidFill>
-                  <a:srgbClr val="C9394A"/>
-                </a:solidFill>
-                <a:latin typeface="微软雅黑" charset="0"/>
-                <a:ea typeface="微软雅黑" charset="0"/>
-              </a:rPr>
-              <a:t>和创建对象有关的Magic Method</a:t>
-            </a:r>
-            <a:endParaRPr lang="en-GB" sz="2200" b="1" dirty="0" err="1">
-              <a:solidFill>
-                <a:srgbClr val="C9394A"/>
-              </a:solidFill>
-              <a:latin typeface="微软雅黑" charset="0"/>
-              <a:ea typeface="微软雅黑" charset="0"/>
-            </a:endParaRPr>
-          </a:p>
-        </p:txBody>
-      </p:sp>
-      <p:sp>
-        <p:nvSpPr>
-          <p:cNvPr id="87" name="Shape 87"/>
-          <p:cNvSpPr txBox="1"/>
-          <p:nvPr>
-            <p:ph type="body" idx="1"/>
-          </p:nvPr>
-        </p:nvSpPr>
-        <p:spPr>
-          <a:xfrm>
-            <a:off x="1454700" y="1457275"/>
-            <a:ext cx="6668400" cy="3416400"/>
-          </a:xfrm>
-          <a:prstGeom prst="rect">
-            <a:avLst/>
-          </a:prstGeom>
-        </p:spPr>
-        <p:txBody>
-          <a:bodyPr lIns="91425" tIns="91425" rIns="91425" bIns="91425" anchor="t" anchorCtr="0">
-            <a:noAutofit/>
-          </a:bodyPr>
-          <a:lstStyle/>
-          <a:p>
-            <a:pPr marL="457200" lvl="0" indent="-228600" rtl="0">
-              <a:spcBef>
-                <a:spcPts val="0"/>
-              </a:spcBef>
-            </a:pPr>
-            <a:r>
-              <a:rPr lang="en-GB"/>
-              <a:t>__new__( )</a:t>
-            </a:r>
-            <a:endParaRPr lang="en-GB"/>
-          </a:p>
-          <a:p>
-            <a:pPr marL="457200" lvl="0" indent="-228600" rtl="0">
-              <a:spcBef>
-                <a:spcPts val="0"/>
-              </a:spcBef>
-            </a:pPr>
-            <a:r>
-              <a:rPr lang="en-GB"/>
-              <a:t>__init__( )</a:t>
-            </a:r>
-            <a:endParaRPr lang="en-GB"/>
-          </a:p>
-          <a:p>
-            <a:pPr marL="457200" lvl="0" indent="-228600" rtl="0">
-              <a:spcBef>
-                <a:spcPts val="0"/>
-              </a:spcBef>
-            </a:pPr>
-            <a:r>
-              <a:rPr lang="en-GB"/>
-              <a:t>__del__( )</a:t>
-            </a:r>
-          </a:p>
-        </p:txBody>
-      </p:sp>
-    </p:spTree>
-  </p:cSld>
-  <p:clrMapOvr>
-    <a:masterClrMapping/>
-  </p:clrMapOvr>
-  <p:transition spd="slow">
-    <p:fade/>
-  </p:transition>
-  <p:timing>
-    <p:tnLst>
-      <p:par>
-        <p:cTn id="1" dur="indefinite" restart="never" nodeType="tmRoot">
-          <p:childTnLst>
-            <p:seq concurrent="1" nextAc="seek">
-              <p:cTn id="2" dur="indefinite" nodeType="mainSeq">
-                <p:childTnLst>
-                  <p:par>
-                    <p:cTn id="3" fill="hold">
-                      <p:stCondLst>
-                        <p:cond delay="indefinite"/>
-                      </p:stCondLst>
-                      <p:childTnLst>
-                        <p:par>
-                          <p:cTn id="4" fill="hold">
-                            <p:stCondLst>
-                              <p:cond delay="0"/>
-                            </p:stCondLst>
-                            <p:childTnLst>
-                              <p:par>
-                                <p:cTn id="5" presetID="10" presetClass="entr" presetSubtype="0" fill="hold" nodeType="clickEffect">
-                                  <p:stCondLst>
-                                    <p:cond delay="0"/>
-                                  </p:stCondLst>
-                                  <p:childTnLst>
-                                    <p:set>
-                                      <p:cBhvr>
-                                        <p:cTn id="6" dur="1" fill="hold">
-                                          <p:stCondLst>
-                                            <p:cond delay="0"/>
-                                          </p:stCondLst>
-                                        </p:cTn>
-                                        <p:tgtEl>
-                                          <p:spTgt spid="87"/>
-                                        </p:tgtEl>
-                                        <p:attrNameLst>
-                                          <p:attrName>style.visibility</p:attrName>
-                                        </p:attrNameLst>
-                                      </p:cBhvr>
-                                      <p:to>
-                                        <p:strVal val="visible"/>
-                                      </p:to>
-                                    </p:set>
-                                    <p:animEffect transition="in" filter="fade">
-                                      <p:cBhvr>
-                                        <p:cTn id="7" dur="1000"/>
-                                        <p:tgtEl>
-                                          <p:spTgt spid="87"/>
                                         </p:tgtEl>
                                       </p:cBhvr>
                                     </p:animEffect>

</xml_diff>